<commit_message>
add isometric arc bin view to oklab/oklch colors
</commit_message>
<xml_diff>
--- a/color_spaces/oklab_vs_oklch.pptx
+++ b/color_spaces/oklab_vs_oklch.pptx
@@ -260,7 +260,7 @@
           <a:p>
             <a:fld id="{EEDB5FBA-DE23-4835-A853-3EE2941C2EB8}" type="datetimeFigureOut">
               <a:rPr lang="en-US" smtClean="0"/>
-              <a:t>12/15/2025</a:t>
+              <a:t>12/19/2025</a:t>
             </a:fld>
             <a:endParaRPr lang="en-US"/>
           </a:p>
@@ -458,7 +458,7 @@
           <a:p>
             <a:fld id="{EEDB5FBA-DE23-4835-A853-3EE2941C2EB8}" type="datetimeFigureOut">
               <a:rPr lang="en-US" smtClean="0"/>
-              <a:t>12/15/2025</a:t>
+              <a:t>12/19/2025</a:t>
             </a:fld>
             <a:endParaRPr lang="en-US"/>
           </a:p>
@@ -666,7 +666,7 @@
           <a:p>
             <a:fld id="{EEDB5FBA-DE23-4835-A853-3EE2941C2EB8}" type="datetimeFigureOut">
               <a:rPr lang="en-US" smtClean="0"/>
-              <a:t>12/15/2025</a:t>
+              <a:t>12/19/2025</a:t>
             </a:fld>
             <a:endParaRPr lang="en-US"/>
           </a:p>
@@ -864,7 +864,7 @@
           <a:p>
             <a:fld id="{EEDB5FBA-DE23-4835-A853-3EE2941C2EB8}" type="datetimeFigureOut">
               <a:rPr lang="en-US" smtClean="0"/>
-              <a:t>12/15/2025</a:t>
+              <a:t>12/19/2025</a:t>
             </a:fld>
             <a:endParaRPr lang="en-US"/>
           </a:p>
@@ -1139,7 +1139,7 @@
           <a:p>
             <a:fld id="{EEDB5FBA-DE23-4835-A853-3EE2941C2EB8}" type="datetimeFigureOut">
               <a:rPr lang="en-US" smtClean="0"/>
-              <a:t>12/15/2025</a:t>
+              <a:t>12/19/2025</a:t>
             </a:fld>
             <a:endParaRPr lang="en-US"/>
           </a:p>
@@ -1404,7 +1404,7 @@
           <a:p>
             <a:fld id="{EEDB5FBA-DE23-4835-A853-3EE2941C2EB8}" type="datetimeFigureOut">
               <a:rPr lang="en-US" smtClean="0"/>
-              <a:t>12/15/2025</a:t>
+              <a:t>12/19/2025</a:t>
             </a:fld>
             <a:endParaRPr lang="en-US"/>
           </a:p>
@@ -1816,7 +1816,7 @@
           <a:p>
             <a:fld id="{EEDB5FBA-DE23-4835-A853-3EE2941C2EB8}" type="datetimeFigureOut">
               <a:rPr lang="en-US" smtClean="0"/>
-              <a:t>12/15/2025</a:t>
+              <a:t>12/19/2025</a:t>
             </a:fld>
             <a:endParaRPr lang="en-US"/>
           </a:p>
@@ -1957,7 +1957,7 @@
           <a:p>
             <a:fld id="{EEDB5FBA-DE23-4835-A853-3EE2941C2EB8}" type="datetimeFigureOut">
               <a:rPr lang="en-US" smtClean="0"/>
-              <a:t>12/15/2025</a:t>
+              <a:t>12/19/2025</a:t>
             </a:fld>
             <a:endParaRPr lang="en-US"/>
           </a:p>
@@ -2070,7 +2070,7 @@
           <a:p>
             <a:fld id="{EEDB5FBA-DE23-4835-A853-3EE2941C2EB8}" type="datetimeFigureOut">
               <a:rPr lang="en-US" smtClean="0"/>
-              <a:t>12/15/2025</a:t>
+              <a:t>12/19/2025</a:t>
             </a:fld>
             <a:endParaRPr lang="en-US"/>
           </a:p>
@@ -2381,7 +2381,7 @@
           <a:p>
             <a:fld id="{EEDB5FBA-DE23-4835-A853-3EE2941C2EB8}" type="datetimeFigureOut">
               <a:rPr lang="en-US" smtClean="0"/>
-              <a:t>12/15/2025</a:t>
+              <a:t>12/19/2025</a:t>
             </a:fld>
             <a:endParaRPr lang="en-US"/>
           </a:p>
@@ -2669,7 +2669,7 @@
           <a:p>
             <a:fld id="{EEDB5FBA-DE23-4835-A853-3EE2941C2EB8}" type="datetimeFigureOut">
               <a:rPr lang="en-US" smtClean="0"/>
-              <a:t>12/15/2025</a:t>
+              <a:t>12/19/2025</a:t>
             </a:fld>
             <a:endParaRPr lang="en-US"/>
           </a:p>
@@ -2910,7 +2910,7 @@
           <a:p>
             <a:fld id="{EEDB5FBA-DE23-4835-A853-3EE2941C2EB8}" type="datetimeFigureOut">
               <a:rPr lang="en-US" smtClean="0"/>
-              <a:t>12/15/2025</a:t>
+              <a:t>12/19/2025</a:t>
             </a:fld>
             <a:endParaRPr lang="en-US"/>
           </a:p>
@@ -3337,10 +3337,10 @@
       </p:grpSpPr>
       <p:pic>
         <p:nvPicPr>
-          <p:cNvPr id="52" name="Picture 51" descr="A group of different colors&#10;&#10;AI-generated content may be incorrect.">
-            <a:extLst>
-              <a:ext uri="{FF2B5EF4-FFF2-40B4-BE49-F238E27FC236}">
-                <a16:creationId xmlns:a16="http://schemas.microsoft.com/office/drawing/2014/main" id="{7FE097CD-C774-553C-D714-C6ACEDEB4712}"/>
+          <p:cNvPr id="5" name="Picture 4" descr="A group of different colors&#10;&#10;AI-generated content may be incorrect.">
+            <a:extLst>
+              <a:ext uri="{FF2B5EF4-FFF2-40B4-BE49-F238E27FC236}">
+                <a16:creationId xmlns:a16="http://schemas.microsoft.com/office/drawing/2014/main" id="{1E5E1977-677C-1A73-C527-2396D405F9A5}"/>
               </a:ext>
             </a:extLst>
           </p:cNvPr>
@@ -3350,45 +3350,17 @@
           <p:nvPr/>
         </p:nvPicPr>
         <p:blipFill>
-          <a:blip r:embed="rId2"/>
+          <a:blip r:embed="rId2">
+            <a:alphaModFix/>
+          </a:blip>
           <a:stretch>
             <a:fillRect/>
           </a:stretch>
         </p:blipFill>
         <p:spPr>
           <a:xfrm>
-            <a:off x="1426157" y="1462680"/>
-            <a:ext cx="10639003" cy="4781634"/>
-          </a:xfrm>
-          <a:prstGeom prst="rect">
-            <a:avLst/>
-          </a:prstGeom>
-        </p:spPr>
-      </p:pic>
-      <p:pic>
-        <p:nvPicPr>
-          <p:cNvPr id="7" name="Picture 6" descr="A colorful cubes in a shape of a heart&#10;&#10;AI-generated content may be incorrect.">
-            <a:extLst>
-              <a:ext uri="{FF2B5EF4-FFF2-40B4-BE49-F238E27FC236}">
-                <a16:creationId xmlns:a16="http://schemas.microsoft.com/office/drawing/2014/main" id="{C5AFDDA9-C083-7F34-B4A8-83BDFA854F98}"/>
-              </a:ext>
-            </a:extLst>
-          </p:cNvPr>
-          <p:cNvPicPr>
-            <a:picLocks noChangeAspect="1"/>
-          </p:cNvPicPr>
-          <p:nvPr/>
-        </p:nvPicPr>
-        <p:blipFill>
-          <a:blip r:embed="rId3"/>
-          <a:stretch>
-            <a:fillRect/>
-          </a:stretch>
-        </p:blipFill>
-        <p:spPr>
-          <a:xfrm>
-            <a:off x="561996" y="1615686"/>
-            <a:ext cx="695992" cy="721361"/>
+            <a:off x="1684379" y="1658075"/>
+            <a:ext cx="10269987" cy="4452306"/>
           </a:xfrm>
           <a:prstGeom prst="rect">
             <a:avLst/>
@@ -3679,7 +3651,7 @@
         </p:nvSpPr>
         <p:spPr>
           <a:xfrm>
-            <a:off x="1733550" y="2551572"/>
+            <a:off x="1599544" y="2551572"/>
             <a:ext cx="460043" cy="276999"/>
           </a:xfrm>
           <a:prstGeom prst="rect">
@@ -3718,7 +3690,7 @@
         </p:nvCxnSpPr>
         <p:spPr>
           <a:xfrm flipV="1">
-            <a:off x="1953683" y="2370387"/>
+            <a:off x="1819677" y="2370387"/>
             <a:ext cx="0" cy="215620"/>
           </a:xfrm>
           <a:prstGeom prst="line">
@@ -3759,7 +3731,7 @@
         </p:nvSpPr>
         <p:spPr>
           <a:xfrm>
-            <a:off x="11380616" y="2572746"/>
+            <a:off x="11422558" y="2572746"/>
             <a:ext cx="460043" cy="276999"/>
           </a:xfrm>
           <a:prstGeom prst="rect">
@@ -3798,7 +3770,7 @@
         </p:nvCxnSpPr>
         <p:spPr>
           <a:xfrm flipV="1">
-            <a:off x="11600749" y="2391561"/>
+            <a:off x="11642691" y="2391561"/>
             <a:ext cx="0" cy="215620"/>
           </a:xfrm>
           <a:prstGeom prst="line">
@@ -3841,7 +3813,7 @@
         </p:nvCxnSpPr>
         <p:spPr>
           <a:xfrm flipV="1">
-            <a:off x="7574703" y="1711018"/>
+            <a:off x="7505749" y="1711018"/>
             <a:ext cx="0" cy="419407"/>
           </a:xfrm>
           <a:prstGeom prst="straightConnector1">
@@ -3884,7 +3856,7 @@
         </p:nvSpPr>
         <p:spPr>
           <a:xfrm>
-            <a:off x="7444316" y="1410293"/>
+            <a:off x="7375362" y="1410293"/>
             <a:ext cx="460043" cy="307777"/>
           </a:xfrm>
           <a:prstGeom prst="rect">
@@ -3964,7 +3936,7 @@
         </p:nvCxnSpPr>
         <p:spPr>
           <a:xfrm>
-            <a:off x="8258175" y="4079605"/>
+            <a:off x="8189784" y="4079605"/>
             <a:ext cx="478631" cy="0"/>
           </a:xfrm>
           <a:prstGeom prst="straightConnector1">
@@ -4007,7 +3979,7 @@
         </p:nvSpPr>
         <p:spPr>
           <a:xfrm>
-            <a:off x="8668805" y="3911430"/>
+            <a:off x="8600414" y="3911430"/>
             <a:ext cx="460043" cy="307777"/>
           </a:xfrm>
           <a:prstGeom prst="rect">
@@ -4048,7 +4020,7 @@
         </p:nvCxnSpPr>
         <p:spPr>
           <a:xfrm flipV="1">
-            <a:off x="7670178" y="3165475"/>
+            <a:off x="7601787" y="3165475"/>
             <a:ext cx="0" cy="473228"/>
           </a:xfrm>
           <a:prstGeom prst="straightConnector1">
@@ -4091,7 +4063,7 @@
         </p:nvSpPr>
         <p:spPr>
           <a:xfrm>
-            <a:off x="7531106" y="2924167"/>
+            <a:off x="7462715" y="2924167"/>
             <a:ext cx="460043" cy="307777"/>
           </a:xfrm>
           <a:prstGeom prst="rect">
@@ -4132,7 +4104,7 @@
         </p:nvCxnSpPr>
         <p:spPr>
           <a:xfrm>
-            <a:off x="8203405" y="2476627"/>
+            <a:off x="8143445" y="2476627"/>
             <a:ext cx="478631" cy="0"/>
           </a:xfrm>
           <a:prstGeom prst="straightConnector1">
@@ -4175,7 +4147,7 @@
         </p:nvSpPr>
         <p:spPr>
           <a:xfrm>
-            <a:off x="8614035" y="2308452"/>
+            <a:off x="8554075" y="2308452"/>
             <a:ext cx="460043" cy="307777"/>
           </a:xfrm>
           <a:prstGeom prst="rect">
@@ -4297,7 +4269,7 @@
         </p:nvSpPr>
         <p:spPr>
           <a:xfrm>
-            <a:off x="2352558" y="2608894"/>
+            <a:off x="2104082" y="2608894"/>
             <a:ext cx="460043" cy="215444"/>
           </a:xfrm>
           <a:prstGeom prst="rect">
@@ -4338,7 +4310,7 @@
         </p:nvCxnSpPr>
         <p:spPr>
           <a:xfrm flipV="1">
-            <a:off x="2572691" y="2544237"/>
+            <a:off x="2324215" y="2544237"/>
             <a:ext cx="0" cy="99092"/>
           </a:xfrm>
           <a:prstGeom prst="line">
@@ -4379,7 +4351,7 @@
         </p:nvSpPr>
         <p:spPr>
           <a:xfrm>
-            <a:off x="2943789" y="2607181"/>
+            <a:off x="2733929" y="2607181"/>
             <a:ext cx="460043" cy="215444"/>
           </a:xfrm>
           <a:prstGeom prst="rect">
@@ -4420,7 +4392,7 @@
         </p:nvCxnSpPr>
         <p:spPr>
           <a:xfrm flipV="1">
-            <a:off x="3163922" y="2542524"/>
+            <a:off x="2954062" y="2542524"/>
             <a:ext cx="0" cy="99092"/>
           </a:xfrm>
           <a:prstGeom prst="line">
@@ -4461,7 +4433,7 @@
         </p:nvSpPr>
         <p:spPr>
           <a:xfrm>
-            <a:off x="3679537" y="2610356"/>
+            <a:off x="3490663" y="2610356"/>
             <a:ext cx="460043" cy="215444"/>
           </a:xfrm>
           <a:prstGeom prst="rect">
@@ -4502,7 +4474,7 @@
         </p:nvCxnSpPr>
         <p:spPr>
           <a:xfrm flipV="1">
-            <a:off x="3899670" y="2572746"/>
+            <a:off x="3710796" y="2572746"/>
             <a:ext cx="0" cy="72045"/>
           </a:xfrm>
           <a:prstGeom prst="line">
@@ -4543,7 +4515,7 @@
         </p:nvSpPr>
         <p:spPr>
           <a:xfrm>
-            <a:off x="4537869" y="2618333"/>
+            <a:off x="4363985" y="2618333"/>
             <a:ext cx="460043" cy="215444"/>
           </a:xfrm>
           <a:prstGeom prst="rect">
@@ -4584,7 +4556,7 @@
         </p:nvCxnSpPr>
         <p:spPr>
           <a:xfrm flipV="1">
-            <a:off x="4758002" y="2586007"/>
+            <a:off x="4584118" y="2586007"/>
             <a:ext cx="0" cy="66761"/>
           </a:xfrm>
           <a:prstGeom prst="line">
@@ -4625,7 +4597,7 @@
         </p:nvSpPr>
         <p:spPr>
           <a:xfrm>
-            <a:off x="5508199" y="2616229"/>
+            <a:off x="5379285" y="2616229"/>
             <a:ext cx="460043" cy="215444"/>
           </a:xfrm>
           <a:prstGeom prst="rect">
@@ -4666,7 +4638,7 @@
         </p:nvCxnSpPr>
         <p:spPr>
           <a:xfrm flipV="1">
-            <a:off x="5728332" y="2572746"/>
+            <a:off x="5599418" y="2572746"/>
             <a:ext cx="0" cy="77918"/>
           </a:xfrm>
           <a:prstGeom prst="line">
@@ -4707,7 +4679,7 @@
         </p:nvSpPr>
         <p:spPr>
           <a:xfrm>
-            <a:off x="6611643" y="2623537"/>
+            <a:off x="6506713" y="2623537"/>
             <a:ext cx="460043" cy="215444"/>
           </a:xfrm>
           <a:prstGeom prst="rect">
@@ -4748,7 +4720,7 @@
         </p:nvCxnSpPr>
         <p:spPr>
           <a:xfrm flipV="1">
-            <a:off x="6831776" y="2572746"/>
+            <a:off x="6726846" y="2572746"/>
             <a:ext cx="0" cy="85226"/>
           </a:xfrm>
           <a:prstGeom prst="line">
@@ -4789,7 +4761,7 @@
         </p:nvSpPr>
         <p:spPr>
           <a:xfrm>
-            <a:off x="7945107" y="2617163"/>
+            <a:off x="7885147" y="2617163"/>
             <a:ext cx="460043" cy="215444"/>
           </a:xfrm>
           <a:prstGeom prst="rect">
@@ -4830,7 +4802,7 @@
         </p:nvCxnSpPr>
         <p:spPr>
           <a:xfrm flipV="1">
-            <a:off x="8165240" y="2552506"/>
+            <a:off x="8105280" y="2552506"/>
             <a:ext cx="0" cy="99092"/>
           </a:xfrm>
           <a:prstGeom prst="line">
@@ -4953,7 +4925,7 @@
         </p:nvSpPr>
         <p:spPr>
           <a:xfrm>
-            <a:off x="10655947" y="2627029"/>
+            <a:off x="10675567" y="2627029"/>
             <a:ext cx="460043" cy="215444"/>
           </a:xfrm>
           <a:prstGeom prst="rect">
@@ -4994,7 +4966,7 @@
         </p:nvCxnSpPr>
         <p:spPr>
           <a:xfrm flipV="1">
-            <a:off x="10876080" y="2562372"/>
+            <a:off x="10895700" y="2562372"/>
             <a:ext cx="0" cy="99092"/>
           </a:xfrm>
           <a:prstGeom prst="line">
@@ -5035,7 +5007,7 @@
         </p:nvSpPr>
         <p:spPr>
           <a:xfrm>
-            <a:off x="1704972" y="4139106"/>
+            <a:off x="1581897" y="4139106"/>
             <a:ext cx="460043" cy="276999"/>
           </a:xfrm>
           <a:prstGeom prst="rect">
@@ -5074,7 +5046,7 @@
         </p:nvCxnSpPr>
         <p:spPr>
           <a:xfrm flipV="1">
-            <a:off x="1925105" y="3957921"/>
+            <a:off x="1802030" y="3957921"/>
             <a:ext cx="0" cy="215620"/>
           </a:xfrm>
           <a:prstGeom prst="line">
@@ -5115,7 +5087,7 @@
         </p:nvSpPr>
         <p:spPr>
           <a:xfrm>
-            <a:off x="11401256" y="4163455"/>
+            <a:off x="11456982" y="4163455"/>
             <a:ext cx="460043" cy="276999"/>
           </a:xfrm>
           <a:prstGeom prst="rect">
@@ -5154,7 +5126,7 @@
         </p:nvCxnSpPr>
         <p:spPr>
           <a:xfrm flipV="1">
-            <a:off x="11621389" y="3982270"/>
+            <a:off x="11677115" y="3982270"/>
             <a:ext cx="0" cy="215620"/>
           </a:xfrm>
           <a:prstGeom prst="line">
@@ -5195,7 +5167,7 @@
         </p:nvSpPr>
         <p:spPr>
           <a:xfrm>
-            <a:off x="2290645" y="4196428"/>
+            <a:off x="2066168" y="4196428"/>
             <a:ext cx="460043" cy="215444"/>
           </a:xfrm>
           <a:prstGeom prst="rect">
@@ -5236,7 +5208,7 @@
         </p:nvCxnSpPr>
         <p:spPr>
           <a:xfrm flipV="1">
-            <a:off x="2510778" y="4131771"/>
+            <a:off x="2286301" y="4131771"/>
             <a:ext cx="0" cy="99092"/>
           </a:xfrm>
           <a:prstGeom prst="line">
@@ -5277,7 +5249,7 @@
         </p:nvSpPr>
         <p:spPr>
           <a:xfrm>
-            <a:off x="2919974" y="4194715"/>
+            <a:off x="2727466" y="4194715"/>
             <a:ext cx="460043" cy="215444"/>
           </a:xfrm>
           <a:prstGeom prst="rect">
@@ -5318,7 +5290,7 @@
         </p:nvCxnSpPr>
         <p:spPr>
           <a:xfrm flipV="1">
-            <a:off x="3140107" y="4130058"/>
+            <a:off x="2947599" y="4130058"/>
             <a:ext cx="0" cy="99092"/>
           </a:xfrm>
           <a:prstGeom prst="line">
@@ -5359,7 +5331,7 @@
         </p:nvSpPr>
         <p:spPr>
           <a:xfrm>
-            <a:off x="3674774" y="4194715"/>
+            <a:off x="3492398" y="4194715"/>
             <a:ext cx="460043" cy="215444"/>
           </a:xfrm>
           <a:prstGeom prst="rect">
@@ -5400,7 +5372,7 @@
         </p:nvCxnSpPr>
         <p:spPr>
           <a:xfrm flipV="1">
-            <a:off x="3894907" y="4130058"/>
+            <a:off x="3712531" y="4130058"/>
             <a:ext cx="0" cy="99092"/>
           </a:xfrm>
           <a:prstGeom prst="line">
@@ -5441,7 +5413,7 @@
         </p:nvSpPr>
         <p:spPr>
           <a:xfrm>
-            <a:off x="4595021" y="4205867"/>
+            <a:off x="4435442" y="4205867"/>
             <a:ext cx="460043" cy="215444"/>
           </a:xfrm>
           <a:prstGeom prst="rect">
@@ -5482,7 +5454,7 @@
         </p:nvCxnSpPr>
         <p:spPr>
           <a:xfrm flipV="1">
-            <a:off x="4815154" y="4141210"/>
+            <a:off x="4655575" y="4141210"/>
             <a:ext cx="0" cy="99092"/>
           </a:xfrm>
           <a:prstGeom prst="line">
@@ -5523,7 +5495,7 @@
         </p:nvSpPr>
         <p:spPr>
           <a:xfrm>
-            <a:off x="5622505" y="4203763"/>
+            <a:off x="5490789" y="4203763"/>
             <a:ext cx="460043" cy="215444"/>
           </a:xfrm>
           <a:prstGeom prst="rect">
@@ -5564,7 +5536,7 @@
         </p:nvCxnSpPr>
         <p:spPr>
           <a:xfrm flipV="1">
-            <a:off x="5842638" y="4139106"/>
+            <a:off x="5710922" y="4139106"/>
             <a:ext cx="0" cy="99092"/>
           </a:xfrm>
           <a:prstGeom prst="line">
@@ -5605,7 +5577,7 @@
         </p:nvSpPr>
         <p:spPr>
           <a:xfrm>
-            <a:off x="6747113" y="4211071"/>
+            <a:off x="6655925" y="4211071"/>
             <a:ext cx="460043" cy="215444"/>
           </a:xfrm>
           <a:prstGeom prst="rect">
@@ -5646,7 +5618,7 @@
         </p:nvCxnSpPr>
         <p:spPr>
           <a:xfrm flipV="1">
-            <a:off x="6967246" y="4146414"/>
+            <a:off x="6876058" y="4146414"/>
             <a:ext cx="0" cy="99092"/>
           </a:xfrm>
           <a:prstGeom prst="line">
@@ -5687,7 +5659,7 @@
         </p:nvSpPr>
         <p:spPr>
           <a:xfrm>
-            <a:off x="8035599" y="4204697"/>
+            <a:off x="7967208" y="4204697"/>
             <a:ext cx="460043" cy="215444"/>
           </a:xfrm>
           <a:prstGeom prst="rect">
@@ -5728,7 +5700,7 @@
         </p:nvCxnSpPr>
         <p:spPr>
           <a:xfrm flipV="1">
-            <a:off x="8255732" y="4140040"/>
+            <a:off x="8187341" y="4140040"/>
             <a:ext cx="0" cy="99092"/>
           </a:xfrm>
           <a:prstGeom prst="line">
@@ -5769,7 +5741,7 @@
         </p:nvSpPr>
         <p:spPr>
           <a:xfrm>
-            <a:off x="9391019" y="4204697"/>
+            <a:off x="9378354" y="4204697"/>
             <a:ext cx="460043" cy="215444"/>
           </a:xfrm>
           <a:prstGeom prst="rect">
@@ -5810,7 +5782,7 @@
         </p:nvCxnSpPr>
         <p:spPr>
           <a:xfrm flipV="1">
-            <a:off x="9611152" y="4140040"/>
+            <a:off x="9598487" y="4140040"/>
             <a:ext cx="0" cy="99092"/>
           </a:xfrm>
           <a:prstGeom prst="line">
@@ -5851,7 +5823,7 @@
         </p:nvSpPr>
         <p:spPr>
           <a:xfrm>
-            <a:off x="10651184" y="4214563"/>
+            <a:off x="10666382" y="4214563"/>
             <a:ext cx="460043" cy="215444"/>
           </a:xfrm>
           <a:prstGeom prst="rect">
@@ -5892,7 +5864,7 @@
         </p:nvCxnSpPr>
         <p:spPr>
           <a:xfrm flipV="1">
-            <a:off x="10871317" y="4149906"/>
+            <a:off x="10886515" y="4149906"/>
             <a:ext cx="0" cy="99092"/>
           </a:xfrm>
           <a:prstGeom prst="line">
@@ -5935,7 +5907,7 @@
         </p:nvCxnSpPr>
         <p:spPr>
           <a:xfrm>
-            <a:off x="5844819" y="3648752"/>
+            <a:off x="5718169" y="3648752"/>
             <a:ext cx="444026" cy="0"/>
           </a:xfrm>
           <a:prstGeom prst="straightConnector1">
@@ -5978,7 +5950,7 @@
         </p:nvSpPr>
         <p:spPr>
           <a:xfrm>
-            <a:off x="6206485" y="3480422"/>
+            <a:off x="6079835" y="3480422"/>
             <a:ext cx="285650" cy="307777"/>
           </a:xfrm>
           <a:prstGeom prst="rect">
@@ -6017,7 +5989,7 @@
         </p:nvSpPr>
         <p:spPr>
           <a:xfrm>
-            <a:off x="5441277" y="3167977"/>
+            <a:off x="5314627" y="3167977"/>
             <a:ext cx="847568" cy="847568"/>
           </a:xfrm>
           <a:prstGeom prst="arc">
@@ -6071,7 +6043,7 @@
         </p:nvSpPr>
         <p:spPr>
           <a:xfrm>
-            <a:off x="5671676" y="3002436"/>
+            <a:off x="5545026" y="3002436"/>
             <a:ext cx="460043" cy="307777"/>
           </a:xfrm>
           <a:prstGeom prst="rect">
@@ -6741,7 +6713,7 @@
         </p:nvSpPr>
         <p:spPr>
           <a:xfrm>
-            <a:off x="2185309" y="6342681"/>
+            <a:off x="2212501" y="6342681"/>
             <a:ext cx="627292" cy="276999"/>
           </a:xfrm>
           <a:prstGeom prst="rect">
@@ -6780,7 +6752,7 @@
         </p:nvCxnSpPr>
         <p:spPr>
           <a:xfrm flipV="1">
-            <a:off x="2442721" y="6157632"/>
+            <a:off x="2469913" y="6157632"/>
             <a:ext cx="0" cy="215620"/>
           </a:xfrm>
           <a:prstGeom prst="line">
@@ -7296,6 +7268,36 @@
           </a:p>
         </p:txBody>
       </p:sp>
+      <p:pic>
+        <p:nvPicPr>
+          <p:cNvPr id="3" name="Picture 2" descr="A colorful cubes stacked together&#10;&#10;AI-generated content may be incorrect.">
+            <a:extLst>
+              <a:ext uri="{FF2B5EF4-FFF2-40B4-BE49-F238E27FC236}">
+                <a16:creationId xmlns:a16="http://schemas.microsoft.com/office/drawing/2014/main" id="{31A9C12A-00EC-1B79-325C-A4C343B49C46}"/>
+              </a:ext>
+            </a:extLst>
+          </p:cNvPr>
+          <p:cNvPicPr>
+            <a:picLocks noChangeAspect="1"/>
+          </p:cNvPicPr>
+          <p:nvPr/>
+        </p:nvPicPr>
+        <p:blipFill>
+          <a:blip r:embed="rId3"/>
+          <a:stretch>
+            <a:fillRect/>
+          </a:stretch>
+        </p:blipFill>
+        <p:spPr>
+          <a:xfrm>
+            <a:off x="555964" y="1567611"/>
+            <a:ext cx="713442" cy="770311"/>
+          </a:xfrm>
+          <a:prstGeom prst="rect">
+            <a:avLst/>
+          </a:prstGeom>
+        </p:spPr>
+      </p:pic>
     </p:spTree>
     <p:extLst>
       <p:ext uri="{BB962C8B-B14F-4D97-AF65-F5344CB8AC3E}">

</xml_diff>

<commit_message>
fix c/h labels on oklch diagram
</commit_message>
<xml_diff>
--- a/color_spaces/oklab_vs_oklch.pptx
+++ b/color_spaces/oklab_vs_oklch.pptx
@@ -261,7 +261,7 @@
           <a:p>
             <a:fld id="{EEDB5FBA-DE23-4835-A853-3EE2941C2EB8}" type="datetimeFigureOut">
               <a:rPr lang="en-US" smtClean="0"/>
-              <a:t>12/19/2025</a:t>
+              <a:t>12/21/2025</a:t>
             </a:fld>
             <a:endParaRPr lang="en-US"/>
           </a:p>
@@ -459,7 +459,7 @@
           <a:p>
             <a:fld id="{EEDB5FBA-DE23-4835-A853-3EE2941C2EB8}" type="datetimeFigureOut">
               <a:rPr lang="en-US" smtClean="0"/>
-              <a:t>12/19/2025</a:t>
+              <a:t>12/21/2025</a:t>
             </a:fld>
             <a:endParaRPr lang="en-US"/>
           </a:p>
@@ -667,7 +667,7 @@
           <a:p>
             <a:fld id="{EEDB5FBA-DE23-4835-A853-3EE2941C2EB8}" type="datetimeFigureOut">
               <a:rPr lang="en-US" smtClean="0"/>
-              <a:t>12/19/2025</a:t>
+              <a:t>12/21/2025</a:t>
             </a:fld>
             <a:endParaRPr lang="en-US"/>
           </a:p>
@@ -865,7 +865,7 @@
           <a:p>
             <a:fld id="{EEDB5FBA-DE23-4835-A853-3EE2941C2EB8}" type="datetimeFigureOut">
               <a:rPr lang="en-US" smtClean="0"/>
-              <a:t>12/19/2025</a:t>
+              <a:t>12/21/2025</a:t>
             </a:fld>
             <a:endParaRPr lang="en-US"/>
           </a:p>
@@ -1140,7 +1140,7 @@
           <a:p>
             <a:fld id="{EEDB5FBA-DE23-4835-A853-3EE2941C2EB8}" type="datetimeFigureOut">
               <a:rPr lang="en-US" smtClean="0"/>
-              <a:t>12/19/2025</a:t>
+              <a:t>12/21/2025</a:t>
             </a:fld>
             <a:endParaRPr lang="en-US"/>
           </a:p>
@@ -1405,7 +1405,7 @@
           <a:p>
             <a:fld id="{EEDB5FBA-DE23-4835-A853-3EE2941C2EB8}" type="datetimeFigureOut">
               <a:rPr lang="en-US" smtClean="0"/>
-              <a:t>12/19/2025</a:t>
+              <a:t>12/21/2025</a:t>
             </a:fld>
             <a:endParaRPr lang="en-US"/>
           </a:p>
@@ -1817,7 +1817,7 @@
           <a:p>
             <a:fld id="{EEDB5FBA-DE23-4835-A853-3EE2941C2EB8}" type="datetimeFigureOut">
               <a:rPr lang="en-US" smtClean="0"/>
-              <a:t>12/19/2025</a:t>
+              <a:t>12/21/2025</a:t>
             </a:fld>
             <a:endParaRPr lang="en-US"/>
           </a:p>
@@ -1958,7 +1958,7 @@
           <a:p>
             <a:fld id="{EEDB5FBA-DE23-4835-A853-3EE2941C2EB8}" type="datetimeFigureOut">
               <a:rPr lang="en-US" smtClean="0"/>
-              <a:t>12/19/2025</a:t>
+              <a:t>12/21/2025</a:t>
             </a:fld>
             <a:endParaRPr lang="en-US"/>
           </a:p>
@@ -2071,7 +2071,7 @@
           <a:p>
             <a:fld id="{EEDB5FBA-DE23-4835-A853-3EE2941C2EB8}" type="datetimeFigureOut">
               <a:rPr lang="en-US" smtClean="0"/>
-              <a:t>12/19/2025</a:t>
+              <a:t>12/21/2025</a:t>
             </a:fld>
             <a:endParaRPr lang="en-US"/>
           </a:p>
@@ -2382,7 +2382,7 @@
           <a:p>
             <a:fld id="{EEDB5FBA-DE23-4835-A853-3EE2941C2EB8}" type="datetimeFigureOut">
               <a:rPr lang="en-US" smtClean="0"/>
-              <a:t>12/19/2025</a:t>
+              <a:t>12/21/2025</a:t>
             </a:fld>
             <a:endParaRPr lang="en-US"/>
           </a:p>
@@ -2670,7 +2670,7 @@
           <a:p>
             <a:fld id="{EEDB5FBA-DE23-4835-A853-3EE2941C2EB8}" type="datetimeFigureOut">
               <a:rPr lang="en-US" smtClean="0"/>
-              <a:t>12/19/2025</a:t>
+              <a:t>12/21/2025</a:t>
             </a:fld>
             <a:endParaRPr lang="en-US"/>
           </a:p>
@@ -2911,7 +2911,7 @@
           <a:p>
             <a:fld id="{EEDB5FBA-DE23-4835-A853-3EE2941C2EB8}" type="datetimeFigureOut">
               <a:rPr lang="en-US" smtClean="0"/>
-              <a:t>12/19/2025</a:t>
+              <a:t>12/21/2025</a:t>
             </a:fld>
             <a:endParaRPr lang="en-US"/>
           </a:p>
@@ -6053,7 +6053,7 @@
                 <a:ea typeface="+mn-ea"/>
                 <a:cs typeface="+mn-cs"/>
               </a:rPr>
-              <a:t>c</a:t>
+              <a:t>h</a:t>
             </a:r>
           </a:p>
         </p:txBody>
@@ -6201,7 +6201,7 @@
                 <a:ea typeface="+mn-ea"/>
                 <a:cs typeface="+mn-cs"/>
               </a:rPr>
-              <a:t>h</a:t>
+              <a:t>c</a:t>
             </a:r>
           </a:p>
         </p:txBody>
@@ -6439,7 +6439,7 @@
                   <a:ea typeface="+mn-ea"/>
                   <a:cs typeface="+mn-cs"/>
                 </a:rPr>
-                <a:t>c</a:t>
+                <a:t>h</a:t>
               </a:r>
             </a:p>
           </p:txBody>
@@ -6504,7 +6504,7 @@
                   <a:ea typeface="+mn-ea"/>
                   <a:cs typeface="+mn-cs"/>
                 </a:rPr>
-                <a:t>h</a:t>
+                <a:t>c</a:t>
               </a:r>
             </a:p>
           </p:txBody>

</xml_diff>

<commit_message>
small adjustments to label spacing
</commit_message>
<xml_diff>
--- a/color_spaces/oklab_vs_oklch.pptx
+++ b/color_spaces/oklab_vs_oklch.pptx
@@ -3630,7 +3630,7 @@
         </p:nvSpPr>
         <p:spPr>
           <a:xfrm>
-            <a:off x="43937" y="405906"/>
+            <a:off x="79259" y="405672"/>
             <a:ext cx="1247457" cy="369332"/>
           </a:xfrm>
           <a:prstGeom prst="rect">
@@ -3762,8 +3762,8 @@
         </p:nvCxnSpPr>
         <p:spPr>
           <a:xfrm flipV="1">
-            <a:off x="79259" y="2713521"/>
-            <a:ext cx="11993679" cy="39211"/>
+            <a:off x="150920" y="2713521"/>
+            <a:ext cx="11922018" cy="38977"/>
           </a:xfrm>
           <a:prstGeom prst="line">
             <a:avLst/>
@@ -4778,7 +4778,7 @@
         </p:nvSpPr>
         <p:spPr>
           <a:xfrm>
-            <a:off x="1655407" y="4357288"/>
+            <a:off x="1655407" y="4419433"/>
             <a:ext cx="460043" cy="276999"/>
           </a:xfrm>
           <a:prstGeom prst="rect">

</xml_diff>